<commit_message>
saved the ppt changes
</commit_message>
<xml_diff>
--- a/SQL/Day 6 Temp Tables/Temp Tables SQL.pptx
+++ b/SQL/Day 6 Temp Tables/Temp Tables SQL.pptx
@@ -9894,20 +9894,13 @@
             <a:pPr lvl="1"/>
             <a:r>
               <a:rPr lang="en-US" b="0" i="0" dirty="0">
+                <a:solidFill>
+                  <a:schemeClr val="tx1"/>
+                </a:solidFill>
                 <a:effectLst/>
                 <a:latin typeface="Söhne Mono"/>
               </a:rPr>
-              <a:t>Create an intermediate table for data transformation</a:t>
-            </a:r>
-            <a:r>
-              <a:rPr lang="en-US" b="0" i="0" dirty="0">
-                <a:solidFill>
-                  <a:srgbClr val="FFFFFF"/>
-                </a:solidFill>
-                <a:effectLst/>
-                <a:latin typeface="Söhne Mono"/>
-              </a:rPr>
-              <a:t> </a:t>
+              <a:t>Create an intermediate table for data transformation </a:t>
             </a:r>
           </a:p>
           <a:p>

</xml_diff>

<commit_message>
small updates to files
</commit_message>
<xml_diff>
--- a/SQL/Day 6 Temp Tables/Temp Tables SQL.pptx
+++ b/SQL/Day 6 Temp Tables/Temp Tables SQL.pptx
@@ -351,7 +351,7 @@
               <a:pPr>
                 <a:defRPr/>
               </a:pPr>
-              <a:t>1/28/24</a:t>
+              <a:t>2/21/25</a:t>
             </a:fld>
             <a:endParaRPr lang="en-US" dirty="0"/>
           </a:p>
@@ -561,7 +561,7 @@
               <a:pPr>
                 <a:defRPr/>
               </a:pPr>
-              <a:t>1/28/24</a:t>
+              <a:t>2/21/25</a:t>
             </a:fld>
             <a:endParaRPr lang="en-US" dirty="0"/>
           </a:p>
@@ -9379,6 +9379,11 @@
               </a:rPr>
               <a:t> * </a:t>
             </a:r>
+          </a:p>
+          <a:p>
+            <a:pPr marL="914400" lvl="2" indent="0">
+              <a:buNone/>
+            </a:pPr>
             <a:r>
               <a:rPr lang="en-US" b="0" i="0" dirty="0">
                 <a:solidFill>
@@ -19566,21 +19571,6 @@
 </file>
 
 <file path=customXml/item1.xml><?xml version="1.0" encoding="utf-8"?>
-<p:properties xmlns:p="http://schemas.microsoft.com/office/2006/metadata/properties" xmlns:xsi="http://www.w3.org/2001/XMLSchema-instance" xmlns:pc="http://schemas.microsoft.com/office/infopath/2007/PartnerControls">
-  <documentManagement/>
-</p:properties>
-</file>
-
-<file path=customXml/item2.xml><?xml version="1.0" encoding="utf-8"?>
-<?mso-contentType ?>
-<FormTemplates xmlns="http://schemas.microsoft.com/sharepoint/v3/contenttype/forms">
-  <Display>DocumentLibraryForm</Display>
-  <Edit>DocumentLibraryForm</Edit>
-  <New>DocumentLibraryForm</New>
-</FormTemplates>
-</file>
-
-<file path=customXml/item3.xml><?xml version="1.0" encoding="utf-8"?>
 <ct:contentTypeSchema xmlns:ct="http://schemas.microsoft.com/office/2006/metadata/contentType" xmlns:ma="http://schemas.microsoft.com/office/2006/metadata/properties/metaAttributes" ct:_="" ma:_="" ma:contentTypeName="Document" ma:contentTypeID="0x010100D717D047DAB2764FBE8B85865ADF125C" ma:contentTypeVersion="0" ma:contentTypeDescription="Create a new document." ma:contentTypeScope="" ma:versionID="3154522c01a2510568c44eaa3f86772f">
   <xsd:schema xmlns:xsd="http://www.w3.org/2001/XMLSchema" xmlns:xs="http://www.w3.org/2001/XMLSchema" xmlns:p="http://schemas.microsoft.com/office/2006/metadata/properties" targetNamespace="http://schemas.microsoft.com/office/2006/metadata/properties" ma:root="true" ma:fieldsID="1b05d82d297216baf5b26c55225140df">
     <xsd:element name="properties">
@@ -19694,17 +19684,33 @@
 </ct:contentTypeSchema>
 </file>
 
+<file path=customXml/item2.xml><?xml version="1.0" encoding="utf-8"?>
+<?mso-contentType ?>
+<FormTemplates xmlns="http://schemas.microsoft.com/sharepoint/v3/contenttype/forms">
+  <Display>DocumentLibraryForm</Display>
+  <Edit>DocumentLibraryForm</Edit>
+  <New>DocumentLibraryForm</New>
+</FormTemplates>
+</file>
+
+<file path=customXml/item3.xml><?xml version="1.0" encoding="utf-8"?>
+<p:properties xmlns:p="http://schemas.microsoft.com/office/2006/metadata/properties" xmlns:xsi="http://www.w3.org/2001/XMLSchema-instance" xmlns:pc="http://schemas.microsoft.com/office/infopath/2007/PartnerControls">
+  <documentManagement/>
+</p:properties>
+</file>
+
 <file path=customXml/itemProps1.xml><?xml version="1.0" encoding="utf-8"?>
-<ds:datastoreItem xmlns:ds="http://schemas.openxmlformats.org/officeDocument/2006/customXml" ds:itemID="{C530F82F-BEB8-4CE5-BAAE-EC5C7B644B7C}">
+<ds:datastoreItem xmlns:ds="http://schemas.openxmlformats.org/officeDocument/2006/customXml" ds:itemID="{959784AE-7718-4684-9BBC-9AAC52D5A526}">
   <ds:schemaRefs>
-    <ds:schemaRef ds:uri="http://schemas.microsoft.com/office/2006/documentManagement/types"/>
+    <ds:schemaRef ds:uri="http://schemas.microsoft.com/office/2006/metadata/contentType"/>
+    <ds:schemaRef ds:uri="http://schemas.microsoft.com/office/2006/metadata/properties/metaAttributes"/>
+    <ds:schemaRef ds:uri="http://www.w3.org/2001/XMLSchema"/>
     <ds:schemaRef ds:uri="http://schemas.microsoft.com/office/2006/metadata/properties"/>
-    <ds:schemaRef ds:uri="http://www.w3.org/XML/1998/namespace"/>
+    <ds:schemaRef ds:uri="http://schemas.openxmlformats.org/package/2006/metadata/core-properties"/>
     <ds:schemaRef ds:uri="http://purl.org/dc/elements/1.1/"/>
-    <ds:schemaRef ds:uri="http://purl.org/dc/dcmitype/"/>
     <ds:schemaRef ds:uri="http://purl.org/dc/terms/"/>
+    <ds:schemaRef ds:uri="http://schemas.microsoft.com/internal/obd"/>
     <ds:schemaRef ds:uri="http://schemas.microsoft.com/office/infopath/2007/PartnerControls"/>
-    <ds:schemaRef ds:uri="http://schemas.openxmlformats.org/package/2006/metadata/core-properties"/>
   </ds:schemaRefs>
 </ds:datastoreItem>
 </file>
@@ -19718,17 +19724,16 @@
 </file>
 
 <file path=customXml/itemProps3.xml><?xml version="1.0" encoding="utf-8"?>
-<ds:datastoreItem xmlns:ds="http://schemas.openxmlformats.org/officeDocument/2006/customXml" ds:itemID="{959784AE-7718-4684-9BBC-9AAC52D5A526}">
+<ds:datastoreItem xmlns:ds="http://schemas.openxmlformats.org/officeDocument/2006/customXml" ds:itemID="{C530F82F-BEB8-4CE5-BAAE-EC5C7B644B7C}">
   <ds:schemaRefs>
-    <ds:schemaRef ds:uri="http://schemas.microsoft.com/office/2006/metadata/contentType"/>
-    <ds:schemaRef ds:uri="http://schemas.microsoft.com/office/2006/metadata/properties/metaAttributes"/>
-    <ds:schemaRef ds:uri="http://www.w3.org/2001/XMLSchema"/>
+    <ds:schemaRef ds:uri="http://schemas.microsoft.com/office/2006/documentManagement/types"/>
     <ds:schemaRef ds:uri="http://schemas.microsoft.com/office/2006/metadata/properties"/>
+    <ds:schemaRef ds:uri="http://www.w3.org/XML/1998/namespace"/>
+    <ds:schemaRef ds:uri="http://purl.org/dc/elements/1.1/"/>
+    <ds:schemaRef ds:uri="http://purl.org/dc/dcmitype/"/>
+    <ds:schemaRef ds:uri="http://purl.org/dc/terms/"/>
+    <ds:schemaRef ds:uri="http://schemas.microsoft.com/office/infopath/2007/PartnerControls"/>
     <ds:schemaRef ds:uri="http://schemas.openxmlformats.org/package/2006/metadata/core-properties"/>
-    <ds:schemaRef ds:uri="http://purl.org/dc/elements/1.1/"/>
-    <ds:schemaRef ds:uri="http://purl.org/dc/terms/"/>
-    <ds:schemaRef ds:uri="http://schemas.microsoft.com/internal/obd"/>
-    <ds:schemaRef ds:uri="http://schemas.microsoft.com/office/infopath/2007/PartnerControls"/>
   </ds:schemaRefs>
 </ds:datastoreItem>
 </file>
</xml_diff>